<commit_message>
Added possible solution to assignment
</commit_message>
<xml_diff>
--- a/ravendb.pptx
+++ b/ravendb.pptx
@@ -921,11 +921,7 @@
             </a:r>
             <a:r>
               <a:rPr lang="nb-NO" baseline="0" dirty="0" smtClean="0"/>
-              <a:t> Create an abstract controller with ability to handle session creations and teardown</a:t>
-            </a:r>
-            <a:r>
-              <a:rPr lang="nb-NO" baseline="0" dirty="0" smtClean="0"/>
-              <a:t>.</a:t>
+              <a:t> Create an abstract controller with ability to handle session creations and teardown.</a:t>
             </a:r>
           </a:p>
           <a:p>
@@ -10979,11 +10975,7 @@
             </a:pPr>
             <a:r>
               <a:rPr lang="nb-NO" sz="1700" dirty="0" smtClean="0"/>
-              <a:t>Add Raven Client from </a:t>
-            </a:r>
-            <a:r>
-              <a:rPr lang="nb-NO" sz="1700" dirty="0" smtClean="0"/>
-              <a:t>Nuget (</a:t>
+              <a:t>Add Raven Client from Nuget (</a:t>
             </a:r>
             <a:r>
               <a:rPr lang="nb-NO" sz="1400" dirty="0">
@@ -11016,11 +11008,7 @@
             </a:pPr>
             <a:r>
               <a:rPr lang="nb-NO" sz="1700" dirty="0" smtClean="0"/>
-              <a:t>Add Raven Server from </a:t>
-            </a:r>
-            <a:r>
-              <a:rPr lang="nb-NO" sz="1700" dirty="0" smtClean="0"/>
-              <a:t>Nuget (</a:t>
+              <a:t>Add Raven Server from Nuget (</a:t>
             </a:r>
             <a:r>
               <a:rPr lang="nb-NO" sz="1400" dirty="0">
@@ -11032,7 +11020,6 @@
               <a:rPr lang="nb-NO" sz="1700" dirty="0" smtClean="0"/>
               <a:t>)</a:t>
             </a:r>
-            <a:endParaRPr lang="nb-NO" sz="1700" dirty="0" smtClean="0"/>
           </a:p>
           <a:p>
             <a:pPr marL="800100" lvl="1" indent="-342900">
@@ -11047,11 +11034,7 @@
             </a:pPr>
             <a:r>
               <a:rPr lang="nb-NO" sz="1600" dirty="0" smtClean="0"/>
-              <a:t>Start </a:t>
-            </a:r>
-            <a:r>
-              <a:rPr lang="nb-NO" sz="1600" dirty="0" smtClean="0"/>
-              <a:t>Raven server from: packages/Raven Server &lt;version&gt;/tools/Raven.Server.exe</a:t>
+              <a:t>Start Raven server from: packages/Raven Server &lt;version&gt;/tools/Raven.Server.exe</a:t>
             </a:r>
             <a:endParaRPr lang="nb-NO" sz="1600" dirty="0"/>
           </a:p>

</xml_diff>

<commit_message>
Added some notes to slides and improved exercise
</commit_message>
<xml_diff>
--- a/ravendb.pptx
+++ b/ravendb.pptx
@@ -551,11 +551,7 @@
           <a:p>
             <a:r>
               <a:rPr lang="nb-NO" baseline="0" dirty="0" smtClean="0"/>
-              <a:t>Er det slik at vi alltid velger relasjonsdatabase fordi det er det vi er vandt til</a:t>
-            </a:r>
-            <a:r>
-              <a:rPr lang="nb-NO" baseline="0" dirty="0" smtClean="0"/>
-              <a:t>?</a:t>
+              <a:t>Er det slik at vi alltid velger relasjonsdatabase fordi det er det vi er vandt til?</a:t>
             </a:r>
           </a:p>
         </p:txBody>
@@ -765,7 +761,12 @@
             <p:ph type="sldImg"/>
           </p:nvPr>
         </p:nvSpPr>
-        <p:spPr/>
+        <p:spPr>
+          <a:xfrm>
+            <a:off x="827088" y="592138"/>
+            <a:ext cx="5226050" cy="3919537"/>
+          </a:xfrm>
+        </p:spPr>
       </p:sp>
       <p:sp>
         <p:nvSpPr>
@@ -920,7 +921,17 @@
             </a:r>
             <a:r>
               <a:rPr lang="nb-NO" baseline="0" dirty="0" smtClean="0"/>
-              <a:t> Create an abstract controller with ability to handle session creations and teardown.</a:t>
+              <a:t> Create an abstract controller with ability to handle session creations and teardown</a:t>
+            </a:r>
+            <a:r>
+              <a:rPr lang="nb-NO" baseline="0" dirty="0" smtClean="0"/>
+              <a:t>.</a:t>
+            </a:r>
+          </a:p>
+          <a:p>
+            <a:r>
+              <a:rPr lang="nb-NO" baseline="0" smtClean="0"/>
+              <a:t>Tip #3: Objects should have an Id property</a:t>
             </a:r>
             <a:endParaRPr lang="nb-NO" dirty="0"/>
           </a:p>
@@ -10927,7 +10938,7 @@
         <p:spPr>
           <a:xfrm>
             <a:off x="321623" y="1409700"/>
-            <a:ext cx="8586005" cy="2375009"/>
+            <a:ext cx="8574783" cy="1508105"/>
           </a:xfrm>
           <a:prstGeom prst="rect">
             <a:avLst/>
@@ -10968,8 +10979,29 @@
             </a:pPr>
             <a:r>
               <a:rPr lang="nb-NO" sz="1700" dirty="0" smtClean="0"/>
-              <a:t>Add Raven Client from Nuget</a:t>
-            </a:r>
+              <a:t>Add Raven Client from </a:t>
+            </a:r>
+            <a:r>
+              <a:rPr lang="nb-NO" sz="1700" dirty="0" smtClean="0"/>
+              <a:t>Nuget (</a:t>
+            </a:r>
+            <a:r>
+              <a:rPr lang="nb-NO" sz="1400" dirty="0">
+                <a:latin typeface="Lucida Console" panose="020B0609040504020204" pitchFamily="49" charset="0"/>
+              </a:rPr>
+              <a:t>Install-package </a:t>
+            </a:r>
+            <a:r>
+              <a:rPr lang="nb-NO" sz="1400" dirty="0" smtClean="0">
+                <a:latin typeface="Lucida Console" panose="020B0609040504020204" pitchFamily="49" charset="0"/>
+              </a:rPr>
+              <a:t>RavenDB.Client</a:t>
+            </a:r>
+            <a:r>
+              <a:rPr lang="nb-NO" sz="1600" dirty="0" smtClean="0"/>
+              <a:t>)</a:t>
+            </a:r>
+            <a:endParaRPr lang="nb-NO" sz="1700" dirty="0" smtClean="0"/>
           </a:p>
           <a:p>
             <a:pPr marL="342900" indent="-342900">
@@ -10984,8 +11016,23 @@
             </a:pPr>
             <a:r>
               <a:rPr lang="nb-NO" sz="1700" dirty="0" smtClean="0"/>
-              <a:t>Add Raven Server from Nuget</a:t>
-            </a:r>
+              <a:t>Add Raven Server from </a:t>
+            </a:r>
+            <a:r>
+              <a:rPr lang="nb-NO" sz="1700" dirty="0" smtClean="0"/>
+              <a:t>Nuget (</a:t>
+            </a:r>
+            <a:r>
+              <a:rPr lang="nb-NO" sz="1400" dirty="0">
+                <a:latin typeface="Lucida Console" panose="020B0609040504020204" pitchFamily="49" charset="0"/>
+              </a:rPr>
+              <a:t>Install-package RavenDB.Server</a:t>
+            </a:r>
+            <a:r>
+              <a:rPr lang="nb-NO" sz="1700" dirty="0" smtClean="0"/>
+              <a:t>)</a:t>
+            </a:r>
+            <a:endParaRPr lang="nb-NO" sz="1700" dirty="0" smtClean="0"/>
           </a:p>
           <a:p>
             <a:pPr marL="800100" lvl="1" indent="-342900">
@@ -11000,46 +11047,11 @@
             </a:pPr>
             <a:r>
               <a:rPr lang="nb-NO" sz="1600" dirty="0" smtClean="0"/>
-              <a:t>Section «Raven/AnonymousAccess» in </a:t>
-            </a:r>
-            <a:br>
+              <a:t>Start </a:t>
+            </a:r>
+            <a:r>
               <a:rPr lang="nb-NO" sz="1600" dirty="0" smtClean="0"/>
-            </a:br>
-            <a:r>
-              <a:rPr lang="nb-NO" sz="1600" dirty="0" smtClean="0"/>
-              <a:t>packages/Raven </a:t>
-            </a:r>
-            <a:r>
-              <a:rPr lang="nb-NO" sz="1600" dirty="0"/>
-              <a:t>Server &lt;version&gt;/</a:t>
-            </a:r>
-            <a:r>
-              <a:rPr lang="nb-NO" sz="1600" dirty="0" smtClean="0"/>
-              <a:t>tools/Raven.Server.exe.config should have value</a:t>
-            </a:r>
-            <a:br>
-              <a:rPr lang="nb-NO" sz="1600" dirty="0" smtClean="0"/>
-            </a:br>
-            <a:r>
-              <a:rPr lang="nb-NO" sz="1600" dirty="0" smtClean="0"/>
-              <a:t>«All».</a:t>
-            </a:r>
-            <a:endParaRPr lang="nb-NO" sz="1600" dirty="0"/>
-          </a:p>
-          <a:p>
-            <a:pPr marL="800100" lvl="1" indent="-342900">
-              <a:spcBef>
-                <a:spcPts val="600"/>
-              </a:spcBef>
-              <a:spcAft>
-                <a:spcPts val="400"/>
-              </a:spcAft>
-              <a:buFont typeface="+mj-lt"/>
-              <a:buAutoNum type="arabicPeriod"/>
-            </a:pPr>
-            <a:r>
-              <a:rPr lang="nb-NO" sz="1600" dirty="0" smtClean="0"/>
-              <a:t>Start Raven server from: packages/Raven Server &lt;version&gt;/tools/Raven.Server.exe</a:t>
+              <a:t>Raven server from: packages/Raven Server &lt;version&gt;/tools/Raven.Server.exe</a:t>
             </a:r>
             <a:endParaRPr lang="nb-NO" sz="1600" dirty="0"/>
           </a:p>

</xml_diff>